<commit_message>
Update Vid 2 - Functional API, Model Subclassing & Custom Layers.pptx
</commit_message>
<xml_diff>
--- a/07NuralNetworks/TF/002MalariaProject/ProjectReport/Vid 2 - Functional API, Model Subclassing & Custom Layers.pptx
+++ b/07NuralNetworks/TF/002MalariaProject/ProjectReport/Vid 2 - Functional API, Model Subclassing & Custom Layers.pptx
@@ -1136,7 +1136,7 @@
           <a:p>
             <a:fld id="{1B04A521-ABE9-4937-B660-EA2BE84D7C65}" type="datetimeFigureOut">
               <a:rPr lang="en-IN" smtClean="0"/>
-              <a:t>06-09-2025</a:t>
+              <a:t>08-09-2025</a:t>
             </a:fld>
             <a:endParaRPr lang="en-IN"/>
           </a:p>
@@ -1336,7 +1336,7 @@
           <a:p>
             <a:fld id="{1B04A521-ABE9-4937-B660-EA2BE84D7C65}" type="datetimeFigureOut">
               <a:rPr lang="en-IN" smtClean="0"/>
-              <a:t>06-09-2025</a:t>
+              <a:t>08-09-2025</a:t>
             </a:fld>
             <a:endParaRPr lang="en-IN"/>
           </a:p>
@@ -1546,7 +1546,7 @@
           <a:p>
             <a:fld id="{1B04A521-ABE9-4937-B660-EA2BE84D7C65}" type="datetimeFigureOut">
               <a:rPr lang="en-IN" smtClean="0"/>
-              <a:t>06-09-2025</a:t>
+              <a:t>08-09-2025</a:t>
             </a:fld>
             <a:endParaRPr lang="en-IN"/>
           </a:p>
@@ -1746,7 +1746,7 @@
           <a:p>
             <a:fld id="{1B04A521-ABE9-4937-B660-EA2BE84D7C65}" type="datetimeFigureOut">
               <a:rPr lang="en-IN" smtClean="0"/>
-              <a:t>06-09-2025</a:t>
+              <a:t>08-09-2025</a:t>
             </a:fld>
             <a:endParaRPr lang="en-IN"/>
           </a:p>
@@ -2022,7 +2022,7 @@
           <a:p>
             <a:fld id="{1B04A521-ABE9-4937-B660-EA2BE84D7C65}" type="datetimeFigureOut">
               <a:rPr lang="en-IN" smtClean="0"/>
-              <a:t>06-09-2025</a:t>
+              <a:t>08-09-2025</a:t>
             </a:fld>
             <a:endParaRPr lang="en-IN"/>
           </a:p>
@@ -2290,7 +2290,7 @@
           <a:p>
             <a:fld id="{1B04A521-ABE9-4937-B660-EA2BE84D7C65}" type="datetimeFigureOut">
               <a:rPr lang="en-IN" smtClean="0"/>
-              <a:t>06-09-2025</a:t>
+              <a:t>08-09-2025</a:t>
             </a:fld>
             <a:endParaRPr lang="en-IN"/>
           </a:p>
@@ -2705,7 +2705,7 @@
           <a:p>
             <a:fld id="{1B04A521-ABE9-4937-B660-EA2BE84D7C65}" type="datetimeFigureOut">
               <a:rPr lang="en-IN" smtClean="0"/>
-              <a:t>06-09-2025</a:t>
+              <a:t>08-09-2025</a:t>
             </a:fld>
             <a:endParaRPr lang="en-IN"/>
           </a:p>
@@ -2847,7 +2847,7 @@
           <a:p>
             <a:fld id="{1B04A521-ABE9-4937-B660-EA2BE84D7C65}" type="datetimeFigureOut">
               <a:rPr lang="en-IN" smtClean="0"/>
-              <a:t>06-09-2025</a:t>
+              <a:t>08-09-2025</a:t>
             </a:fld>
             <a:endParaRPr lang="en-IN"/>
           </a:p>
@@ -2960,7 +2960,7 @@
           <a:p>
             <a:fld id="{1B04A521-ABE9-4937-B660-EA2BE84D7C65}" type="datetimeFigureOut">
               <a:rPr lang="en-IN" smtClean="0"/>
-              <a:t>06-09-2025</a:t>
+              <a:t>08-09-2025</a:t>
             </a:fld>
             <a:endParaRPr lang="en-IN"/>
           </a:p>
@@ -3273,7 +3273,7 @@
           <a:p>
             <a:fld id="{1B04A521-ABE9-4937-B660-EA2BE84D7C65}" type="datetimeFigureOut">
               <a:rPr lang="en-IN" smtClean="0"/>
-              <a:t>06-09-2025</a:t>
+              <a:t>08-09-2025</a:t>
             </a:fld>
             <a:endParaRPr lang="en-IN"/>
           </a:p>
@@ -3562,7 +3562,7 @@
           <a:p>
             <a:fld id="{1B04A521-ABE9-4937-B660-EA2BE84D7C65}" type="datetimeFigureOut">
               <a:rPr lang="en-IN" smtClean="0"/>
-              <a:t>06-09-2025</a:t>
+              <a:t>08-09-2025</a:t>
             </a:fld>
             <a:endParaRPr lang="en-IN"/>
           </a:p>
@@ -3805,7 +3805,7 @@
           <a:p>
             <a:fld id="{1B04A521-ABE9-4937-B660-EA2BE84D7C65}" type="datetimeFigureOut">
               <a:rPr lang="en-IN" smtClean="0"/>
-              <a:t>06-09-2025</a:t>
+              <a:t>08-09-2025</a:t>
             </a:fld>
             <a:endParaRPr lang="en-IN"/>
           </a:p>
@@ -4971,10 +4971,10 @@
       </p:pic>
       <p:pic>
         <p:nvPicPr>
-          <p:cNvPr id="25" name="Picture 24">
-            <a:extLst>
-              <a:ext uri="{FF2B5EF4-FFF2-40B4-BE49-F238E27FC236}">
-                <a16:creationId xmlns:a16="http://schemas.microsoft.com/office/drawing/2014/main" id="{AA40ED32-9C36-C629-3B8D-CFF9406B8996}"/>
+          <p:cNvPr id="31" name="Picture 30">
+            <a:extLst>
+              <a:ext uri="{FF2B5EF4-FFF2-40B4-BE49-F238E27FC236}">
+                <a16:creationId xmlns:a16="http://schemas.microsoft.com/office/drawing/2014/main" id="{C4B31139-3B1D-5807-4051-19DAD3A408BB}"/>
               </a:ext>
             </a:extLst>
           </p:cNvPr>
@@ -4985,36 +4985,6 @@
         </p:nvPicPr>
         <p:blipFill>
           <a:blip r:embed="rId3"/>
-          <a:stretch>
-            <a:fillRect/>
-          </a:stretch>
-        </p:blipFill>
-        <p:spPr>
-          <a:xfrm>
-            <a:off x="0" y="774742"/>
-            <a:ext cx="6166730" cy="3173346"/>
-          </a:xfrm>
-          <a:prstGeom prst="rect">
-            <a:avLst/>
-          </a:prstGeom>
-        </p:spPr>
-      </p:pic>
-      <p:pic>
-        <p:nvPicPr>
-          <p:cNvPr id="31" name="Picture 30">
-            <a:extLst>
-              <a:ext uri="{FF2B5EF4-FFF2-40B4-BE49-F238E27FC236}">
-                <a16:creationId xmlns:a16="http://schemas.microsoft.com/office/drawing/2014/main" id="{C4B31139-3B1D-5807-4051-19DAD3A408BB}"/>
-              </a:ext>
-            </a:extLst>
-          </p:cNvPr>
-          <p:cNvPicPr>
-            <a:picLocks noChangeAspect="1"/>
-          </p:cNvPicPr>
-          <p:nvPr/>
-        </p:nvPicPr>
-        <p:blipFill>
-          <a:blip r:embed="rId4"/>
           <a:stretch>
             <a:fillRect/>
           </a:stretch>
@@ -5044,7 +5014,7 @@
           <p:nvPr/>
         </p:nvPicPr>
         <p:blipFill>
-          <a:blip r:embed="rId5"/>
+          <a:blip r:embed="rId4"/>
           <a:stretch>
             <a:fillRect/>
           </a:stretch>
@@ -5053,6 +5023,36 @@
           <a:xfrm>
             <a:off x="6134512" y="3241476"/>
             <a:ext cx="3800467" cy="3529365"/>
+          </a:xfrm>
+          <a:prstGeom prst="rect">
+            <a:avLst/>
+          </a:prstGeom>
+        </p:spPr>
+      </p:pic>
+      <p:pic>
+        <p:nvPicPr>
+          <p:cNvPr id="7" name="Picture 6">
+            <a:extLst>
+              <a:ext uri="{FF2B5EF4-FFF2-40B4-BE49-F238E27FC236}">
+                <a16:creationId xmlns:a16="http://schemas.microsoft.com/office/drawing/2014/main" id="{BB01C73A-1618-5CE7-E4F4-4E92EBBADDA7}"/>
+              </a:ext>
+            </a:extLst>
+          </p:cNvPr>
+          <p:cNvPicPr>
+            <a:picLocks noChangeAspect="1"/>
+          </p:cNvPicPr>
+          <p:nvPr/>
+        </p:nvPicPr>
+        <p:blipFill>
+          <a:blip r:embed="rId5"/>
+          <a:stretch>
+            <a:fillRect/>
+          </a:stretch>
+        </p:blipFill>
+        <p:spPr>
+          <a:xfrm>
+            <a:off x="99138" y="928744"/>
+            <a:ext cx="5952415" cy="3234385"/>
           </a:xfrm>
           <a:prstGeom prst="rect">
             <a:avLst/>

</xml_diff>